<commit_message>
weak form formula corrected
</commit_message>
<xml_diff>
--- a/doc/source/figures.pptx
+++ b/doc/source/figures.pptx
@@ -193,7 +193,7 @@
           <a:p>
             <a:fld id="{06619A14-1920-4585-AAED-A0A3040C0CE8}" type="datetimeFigureOut">
               <a:rPr kumimoji="1" lang="ja-JP" altLang="en-US" smtClean="0"/>
-              <a:t>2016/2/22</a:t>
+              <a:t>2016/2/23</a:t>
             </a:fld>
             <a:endParaRPr kumimoji="1" lang="ja-JP" altLang="en-US"/>
           </a:p>
@@ -7443,15 +7443,7 @@
           <a:p>
             <a:r>
               <a:rPr kumimoji="1" lang="en-US" altLang="ja-JP" dirty="0" smtClean="0"/>
-              <a:t>Expressiveness of </a:t>
-            </a:r>
-            <a:r>
-              <a:rPr kumimoji="1" lang="en-US" altLang="ja-JP" dirty="0" smtClean="0"/>
-              <a:t>C++ code </a:t>
-            </a:r>
-            <a:r>
-              <a:rPr kumimoji="1" lang="en-US" altLang="ja-JP" dirty="0" smtClean="0"/>
-              <a:t>in </a:t>
+              <a:t>Expressiveness of C++ code in </a:t>
             </a:r>
             <a:r>
               <a:rPr lang="en-US" altLang="ja-JP" dirty="0" smtClean="0"/>
@@ -7639,11 +7631,7 @@
             <a:pPr algn="r"/>
             <a:r>
               <a:rPr lang="en-US" altLang="ja-JP" sz="1600" dirty="0" smtClean="0"/>
-              <a:t>Matrix &amp; vector</a:t>
-            </a:r>
-            <a:r>
-              <a:rPr lang="en-US" altLang="ja-JP" sz="1600" dirty="0" smtClean="0"/>
-              <a:t> </a:t>
+              <a:t>Matrix &amp; vector </a:t>
             </a:r>
           </a:p>
           <a:p>
@@ -7997,15 +7985,7 @@
                   <a:srgbClr val="FF0000"/>
                 </a:solidFill>
               </a:rPr>
-              <a:t>Expressiveness </a:t>
-            </a:r>
-            <a:r>
-              <a:rPr lang="en-US" altLang="ja-JP" sz="1400" dirty="0" smtClean="0">
-                <a:solidFill>
-                  <a:srgbClr val="FF0000"/>
-                </a:solidFill>
-              </a:rPr>
-              <a:t>limit of OOP</a:t>
+              <a:t>Expressiveness limit of OOP</a:t>
             </a:r>
             <a:endParaRPr kumimoji="1" lang="ja-JP" altLang="en-US" sz="1400" dirty="0">
               <a:solidFill>
@@ -8069,9 +8049,118 @@
           </a:extLst>
         </p:spPr>
       </p:pic>
+      <p:cxnSp>
+        <p:nvCxnSpPr>
+          <p:cNvPr id="29" name="直線コネクタ 28"/>
+          <p:cNvCxnSpPr/>
+          <p:nvPr/>
+        </p:nvCxnSpPr>
+        <p:spPr>
+          <a:xfrm flipV="1">
+            <a:off x="4932040" y="4077072"/>
+            <a:ext cx="0" cy="936105"/>
+          </a:xfrm>
+          <a:prstGeom prst="line">
+            <a:avLst/>
+          </a:prstGeom>
+          <a:ln w="22225">
+            <a:solidFill>
+              <a:srgbClr val="FF0000"/>
+            </a:solidFill>
+            <a:prstDash val="dash"/>
+            <a:tailEnd type="none"/>
+          </a:ln>
+        </p:spPr>
+        <p:style>
+          <a:lnRef idx="1">
+            <a:schemeClr val="accent1"/>
+          </a:lnRef>
+          <a:fillRef idx="0">
+            <a:schemeClr val="accent1"/>
+          </a:fillRef>
+          <a:effectRef idx="0">
+            <a:schemeClr val="accent1"/>
+          </a:effectRef>
+          <a:fontRef idx="minor">
+            <a:schemeClr val="tx1"/>
+          </a:fontRef>
+        </p:style>
+      </p:cxnSp>
+      <p:sp>
+        <p:nvSpPr>
+          <p:cNvPr id="47" name="円/楕円 46"/>
+          <p:cNvSpPr/>
+          <p:nvPr/>
+        </p:nvSpPr>
+        <p:spPr bwMode="blackGray">
+          <a:xfrm>
+            <a:off x="4373984" y="4257104"/>
+            <a:ext cx="108000" cy="108000"/>
+          </a:xfrm>
+          <a:prstGeom prst="ellipse">
+            <a:avLst/>
+          </a:prstGeom>
+          <a:solidFill>
+            <a:schemeClr val="tx1"/>
+          </a:solidFill>
+          <a:ln w="9525">
+            <a:solidFill>
+              <a:srgbClr val="0070C0"/>
+            </a:solidFill>
+            <a:round/>
+            <a:headEnd/>
+            <a:tailEnd/>
+          </a:ln>
+          <a:extLst/>
+        </p:spPr>
+        <p:txBody>
+          <a:bodyPr rtlCol="0" anchor="ctr"/>
+          <a:lstStyle/>
+          <a:p>
+            <a:pPr algn="ctr"/>
+            <a:endParaRPr kumimoji="1" lang="ja-JP" altLang="en-US"/>
+          </a:p>
+        </p:txBody>
+      </p:sp>
+      <p:sp>
+        <p:nvSpPr>
+          <p:cNvPr id="48" name="円/楕円 47"/>
+          <p:cNvSpPr/>
+          <p:nvPr/>
+        </p:nvSpPr>
+        <p:spPr bwMode="blackGray">
+          <a:xfrm>
+            <a:off x="4355976" y="2708920"/>
+            <a:ext cx="108000" cy="108000"/>
+          </a:xfrm>
+          <a:prstGeom prst="ellipse">
+            <a:avLst/>
+          </a:prstGeom>
+          <a:solidFill>
+            <a:schemeClr val="tx1"/>
+          </a:solidFill>
+          <a:ln w="9525">
+            <a:solidFill>
+              <a:srgbClr val="0070C0"/>
+            </a:solidFill>
+            <a:round/>
+            <a:headEnd/>
+            <a:tailEnd/>
+          </a:ln>
+          <a:extLst/>
+        </p:spPr>
+        <p:txBody>
+          <a:bodyPr rtlCol="0" anchor="ctr"/>
+          <a:lstStyle/>
+          <a:p>
+            <a:pPr algn="ctr"/>
+            <a:endParaRPr kumimoji="1" lang="ja-JP" altLang="en-US"/>
+          </a:p>
+        </p:txBody>
+      </p:sp>
       <p:pic>
         <p:nvPicPr>
-          <p:cNvPr id="1031" name="Picture 7"/>
+          <p:cNvPr id="2" name="Picture 2"/>
           <p:cNvPicPr>
             <a:picLocks noChangeAspect="1" noChangeArrowheads="1"/>
           </p:cNvPicPr>
@@ -8092,8 +8181,8 @@
         </p:blipFill>
         <p:spPr bwMode="auto">
           <a:xfrm>
-            <a:off x="6516216" y="5381822"/>
-            <a:ext cx="1800200" cy="999506"/>
+            <a:off x="6518796" y="5373216"/>
+            <a:ext cx="1869628" cy="972318"/>
           </a:xfrm>
           <a:prstGeom prst="rect">
             <a:avLst/>
@@ -8123,115 +8212,6 @@
           </a:extLst>
         </p:spPr>
       </p:pic>
-      <p:cxnSp>
-        <p:nvCxnSpPr>
-          <p:cNvPr id="29" name="直線コネクタ 28"/>
-          <p:cNvCxnSpPr/>
-          <p:nvPr/>
-        </p:nvCxnSpPr>
-        <p:spPr>
-          <a:xfrm flipV="1">
-            <a:off x="4932040" y="4077072"/>
-            <a:ext cx="0" cy="936105"/>
-          </a:xfrm>
-          <a:prstGeom prst="line">
-            <a:avLst/>
-          </a:prstGeom>
-          <a:ln w="22225">
-            <a:solidFill>
-              <a:srgbClr val="FF0000"/>
-            </a:solidFill>
-            <a:prstDash val="dash"/>
-            <a:tailEnd type="none"/>
-          </a:ln>
-        </p:spPr>
-        <p:style>
-          <a:lnRef idx="1">
-            <a:schemeClr val="accent1"/>
-          </a:lnRef>
-          <a:fillRef idx="0">
-            <a:schemeClr val="accent1"/>
-          </a:fillRef>
-          <a:effectRef idx="0">
-            <a:schemeClr val="accent1"/>
-          </a:effectRef>
-          <a:fontRef idx="minor">
-            <a:schemeClr val="tx1"/>
-          </a:fontRef>
-        </p:style>
-      </p:cxnSp>
-      <p:sp>
-        <p:nvSpPr>
-          <p:cNvPr id="47" name="円/楕円 46"/>
-          <p:cNvSpPr/>
-          <p:nvPr/>
-        </p:nvSpPr>
-        <p:spPr bwMode="blackGray">
-          <a:xfrm>
-            <a:off x="4373984" y="4257104"/>
-            <a:ext cx="108000" cy="108000"/>
-          </a:xfrm>
-          <a:prstGeom prst="ellipse">
-            <a:avLst/>
-          </a:prstGeom>
-          <a:solidFill>
-            <a:schemeClr val="tx1"/>
-          </a:solidFill>
-          <a:ln w="9525">
-            <a:solidFill>
-              <a:srgbClr val="0070C0"/>
-            </a:solidFill>
-            <a:round/>
-            <a:headEnd/>
-            <a:tailEnd/>
-          </a:ln>
-          <a:extLst/>
-        </p:spPr>
-        <p:txBody>
-          <a:bodyPr rtlCol="0" anchor="ctr"/>
-          <a:lstStyle/>
-          <a:p>
-            <a:pPr algn="ctr"/>
-            <a:endParaRPr kumimoji="1" lang="ja-JP" altLang="en-US"/>
-          </a:p>
-        </p:txBody>
-      </p:sp>
-      <p:sp>
-        <p:nvSpPr>
-          <p:cNvPr id="48" name="円/楕円 47"/>
-          <p:cNvSpPr/>
-          <p:nvPr/>
-        </p:nvSpPr>
-        <p:spPr bwMode="blackGray">
-          <a:xfrm>
-            <a:off x="4355976" y="2708920"/>
-            <a:ext cx="108000" cy="108000"/>
-          </a:xfrm>
-          <a:prstGeom prst="ellipse">
-            <a:avLst/>
-          </a:prstGeom>
-          <a:solidFill>
-            <a:schemeClr val="tx1"/>
-          </a:solidFill>
-          <a:ln w="9525">
-            <a:solidFill>
-              <a:srgbClr val="0070C0"/>
-            </a:solidFill>
-            <a:round/>
-            <a:headEnd/>
-            <a:tailEnd/>
-          </a:ln>
-          <a:extLst/>
-        </p:spPr>
-        <p:txBody>
-          <a:bodyPr rtlCol="0" anchor="ctr"/>
-          <a:lstStyle/>
-          <a:p>
-            <a:pPr algn="ctr"/>
-            <a:endParaRPr kumimoji="1" lang="ja-JP" altLang="en-US"/>
-          </a:p>
-        </p:txBody>
-      </p:sp>
     </p:spTree>
     <p:extLst>
       <p:ext uri="{BB962C8B-B14F-4D97-AF65-F5344CB8AC3E}">
@@ -9023,9 +9003,434 @@
           </a:extLst>
         </p:spPr>
       </p:pic>
+      <p:sp>
+        <p:nvSpPr>
+          <p:cNvPr id="42" name="テキスト ボックス 41"/>
+          <p:cNvSpPr txBox="1"/>
+          <p:nvPr/>
+        </p:nvSpPr>
+        <p:spPr>
+          <a:xfrm>
+            <a:off x="1594798" y="4365104"/>
+            <a:ext cx="312906" cy="369332"/>
+          </a:xfrm>
+          <a:prstGeom prst="rect">
+            <a:avLst/>
+          </a:prstGeom>
+          <a:noFill/>
+        </p:spPr>
+        <p:txBody>
+          <a:bodyPr wrap="none" rtlCol="0">
+            <a:spAutoFit/>
+          </a:bodyPr>
+          <a:lstStyle/>
+          <a:p>
+            <a:r>
+              <a:rPr lang="en-US" altLang="ja-JP" dirty="0" smtClean="0">
+                <a:solidFill>
+                  <a:srgbClr val="FF0000"/>
+                </a:solidFill>
+              </a:rPr>
+              <a:t>1</a:t>
+            </a:r>
+            <a:endParaRPr kumimoji="1" lang="ja-JP" altLang="en-US" dirty="0">
+              <a:solidFill>
+                <a:srgbClr val="FF0000"/>
+              </a:solidFill>
+            </a:endParaRPr>
+          </a:p>
+        </p:txBody>
+      </p:sp>
+      <p:sp>
+        <p:nvSpPr>
+          <p:cNvPr id="25" name="下矢印 24"/>
+          <p:cNvSpPr/>
+          <p:nvPr/>
+        </p:nvSpPr>
+        <p:spPr bwMode="blackGray">
+          <a:xfrm flipV="1">
+            <a:off x="5508104" y="3996353"/>
+            <a:ext cx="216024" cy="521478"/>
+          </a:xfrm>
+          <a:prstGeom prst="downArrow">
+            <a:avLst/>
+          </a:prstGeom>
+          <a:noFill/>
+          <a:ln w="9525">
+            <a:solidFill>
+              <a:schemeClr val="tx1"/>
+            </a:solidFill>
+            <a:round/>
+            <a:headEnd/>
+            <a:tailEnd/>
+          </a:ln>
+          <a:extLst>
+            <a:ext uri="{909E8E84-426E-40DD-AFC4-6F175D3DCCD1}">
+              <a14:hiddenFill xmlns:a14="http://schemas.microsoft.com/office/drawing/2010/main">
+                <a:noFill/>
+              </a14:hiddenFill>
+            </a:ext>
+          </a:extLst>
+        </p:spPr>
+        <p:txBody>
+          <a:bodyPr rtlCol="0" anchor="ctr"/>
+          <a:lstStyle/>
+          <a:p>
+            <a:pPr algn="ctr"/>
+            <a:endParaRPr kumimoji="1" lang="ja-JP" altLang="en-US"/>
+          </a:p>
+        </p:txBody>
+      </p:sp>
+      <p:sp>
+        <p:nvSpPr>
+          <p:cNvPr id="28" name="テキスト ボックス 27"/>
+          <p:cNvSpPr txBox="1"/>
+          <p:nvPr/>
+        </p:nvSpPr>
+        <p:spPr>
+          <a:xfrm>
+            <a:off x="5724128" y="4119463"/>
+            <a:ext cx="1656184" cy="461665"/>
+          </a:xfrm>
+          <a:prstGeom prst="rect">
+            <a:avLst/>
+          </a:prstGeom>
+          <a:noFill/>
+        </p:spPr>
+        <p:txBody>
+          <a:bodyPr wrap="square" rtlCol="0">
+            <a:spAutoFit/>
+          </a:bodyPr>
+          <a:lstStyle/>
+          <a:p>
+            <a:r>
+              <a:rPr lang="en-US" altLang="ja-JP" sz="1200" dirty="0"/>
+              <a:t>P</a:t>
+            </a:r>
+            <a:r>
+              <a:rPr kumimoji="1" lang="en-US" altLang="ja-JP" sz="1200" dirty="0" smtClean="0"/>
+              <a:t>arallelization </a:t>
+            </a:r>
+          </a:p>
+          <a:p>
+            <a:r>
+              <a:rPr kumimoji="1" lang="en-US" altLang="ja-JP" sz="1200" dirty="0" smtClean="0"/>
+              <a:t>by C++ compiler</a:t>
+            </a:r>
+            <a:endParaRPr kumimoji="1" lang="ja-JP" altLang="en-US" sz="1200" dirty="0"/>
+          </a:p>
+        </p:txBody>
+      </p:sp>
+      <p:sp>
+        <p:nvSpPr>
+          <p:cNvPr id="51" name="テキスト ボックス 50"/>
+          <p:cNvSpPr txBox="1"/>
+          <p:nvPr/>
+        </p:nvSpPr>
+        <p:spPr>
+          <a:xfrm>
+            <a:off x="2627784" y="2535287"/>
+            <a:ext cx="1330164" cy="461665"/>
+          </a:xfrm>
+          <a:prstGeom prst="rect">
+            <a:avLst/>
+          </a:prstGeom>
+          <a:noFill/>
+          <a:ln>
+            <a:solidFill>
+              <a:schemeClr val="bg1"/>
+            </a:solidFill>
+          </a:ln>
+        </p:spPr>
+        <p:txBody>
+          <a:bodyPr wrap="square" rtlCol="0">
+            <a:spAutoFit/>
+          </a:bodyPr>
+          <a:lstStyle/>
+          <a:p>
+            <a:r>
+              <a:rPr lang="en-US" altLang="ja-JP" sz="1200" dirty="0">
+                <a:solidFill>
+                  <a:srgbClr val="FF0000"/>
+                </a:solidFill>
+              </a:rPr>
+              <a:t>P</a:t>
+            </a:r>
+            <a:r>
+              <a:rPr kumimoji="1" lang="en-US" altLang="ja-JP" sz="1200" dirty="0" smtClean="0">
+                <a:solidFill>
+                  <a:srgbClr val="FF0000"/>
+                </a:solidFill>
+              </a:rPr>
+              <a:t>arallelization</a:t>
+            </a:r>
+            <a:r>
+              <a:rPr lang="ja-JP" altLang="en-US" sz="1200" dirty="0" smtClean="0">
+                <a:solidFill>
+                  <a:srgbClr val="FF0000"/>
+                </a:solidFill>
+              </a:rPr>
+              <a:t> </a:t>
+            </a:r>
+            <a:endParaRPr lang="en-US" altLang="ja-JP" sz="1200" dirty="0" smtClean="0">
+              <a:solidFill>
+                <a:srgbClr val="FF0000"/>
+              </a:solidFill>
+            </a:endParaRPr>
+          </a:p>
+          <a:p>
+            <a:r>
+              <a:rPr lang="en-US" altLang="ja-JP" sz="1200" dirty="0" smtClean="0">
+                <a:solidFill>
+                  <a:srgbClr val="FF0000"/>
+                </a:solidFill>
+              </a:rPr>
+              <a:t>by hand</a:t>
+            </a:r>
+            <a:endParaRPr kumimoji="1" lang="en-US" altLang="ja-JP" sz="1200" dirty="0" smtClean="0">
+              <a:solidFill>
+                <a:srgbClr val="FF0000"/>
+              </a:solidFill>
+            </a:endParaRPr>
+          </a:p>
+        </p:txBody>
+      </p:sp>
+      <p:sp>
+        <p:nvSpPr>
+          <p:cNvPr id="33" name="テキスト ボックス 32"/>
+          <p:cNvSpPr txBox="1"/>
+          <p:nvPr/>
+        </p:nvSpPr>
+        <p:spPr>
+          <a:xfrm>
+            <a:off x="2010772" y="4869160"/>
+            <a:ext cx="5801588" cy="369332"/>
+          </a:xfrm>
+          <a:prstGeom prst="rect">
+            <a:avLst/>
+          </a:prstGeom>
+          <a:noFill/>
+        </p:spPr>
+        <p:txBody>
+          <a:bodyPr wrap="none" rtlCol="0">
+            <a:spAutoFit/>
+          </a:bodyPr>
+          <a:lstStyle/>
+          <a:p>
+            <a:r>
+              <a:rPr kumimoji="1" lang="en-US" altLang="ja-JP" dirty="0" smtClean="0"/>
+              <a:t>Expressiveness of C++ code in </a:t>
+            </a:r>
+            <a:r>
+              <a:rPr lang="en-US" altLang="ja-JP" dirty="0" smtClean="0"/>
+              <a:t>mathematical modeling</a:t>
+            </a:r>
+            <a:endParaRPr kumimoji="1" lang="ja-JP" altLang="en-US" dirty="0"/>
+          </a:p>
+        </p:txBody>
+      </p:sp>
+      <p:cxnSp>
+        <p:nvCxnSpPr>
+          <p:cNvPr id="37" name="直線矢印コネクタ 36"/>
+          <p:cNvCxnSpPr>
+            <a:stCxn id="13" idx="5"/>
+          </p:cNvCxnSpPr>
+          <p:nvPr/>
+        </p:nvCxnSpPr>
+        <p:spPr>
+          <a:xfrm flipV="1">
+            <a:off x="4484176" y="3915048"/>
+            <a:ext cx="2194064" cy="0"/>
+          </a:xfrm>
+          <a:prstGeom prst="straightConnector1">
+            <a:avLst/>
+          </a:prstGeom>
+          <a:ln w="22225">
+            <a:solidFill>
+              <a:srgbClr val="0070C0"/>
+            </a:solidFill>
+            <a:prstDash val="dash"/>
+            <a:tailEnd type="arrow"/>
+          </a:ln>
+        </p:spPr>
+        <p:style>
+          <a:lnRef idx="1">
+            <a:schemeClr val="accent1"/>
+          </a:lnRef>
+          <a:fillRef idx="0">
+            <a:schemeClr val="accent1"/>
+          </a:fillRef>
+          <a:effectRef idx="0">
+            <a:schemeClr val="accent1"/>
+          </a:effectRef>
+          <a:fontRef idx="minor">
+            <a:schemeClr val="tx1"/>
+          </a:fontRef>
+        </p:style>
+      </p:cxnSp>
+      <p:sp>
+        <p:nvSpPr>
+          <p:cNvPr id="45" name="円/楕円 44"/>
+          <p:cNvSpPr/>
+          <p:nvPr/>
+        </p:nvSpPr>
+        <p:spPr bwMode="blackGray">
+          <a:xfrm>
+            <a:off x="6660232" y="3861048"/>
+            <a:ext cx="108000" cy="108000"/>
+          </a:xfrm>
+          <a:prstGeom prst="ellipse">
+            <a:avLst/>
+          </a:prstGeom>
+          <a:solidFill>
+            <a:schemeClr val="tx1">
+              <a:lumMod val="50000"/>
+              <a:lumOff val="50000"/>
+            </a:schemeClr>
+          </a:solidFill>
+          <a:ln w="9525">
+            <a:solidFill>
+              <a:srgbClr val="0070C0"/>
+            </a:solidFill>
+            <a:round/>
+            <a:headEnd/>
+            <a:tailEnd/>
+          </a:ln>
+          <a:extLst/>
+        </p:spPr>
+        <p:txBody>
+          <a:bodyPr rtlCol="0" anchor="ctr"/>
+          <a:lstStyle/>
+          <a:p>
+            <a:pPr algn="ctr"/>
+            <a:endParaRPr kumimoji="1" lang="ja-JP" altLang="en-US"/>
+          </a:p>
+        </p:txBody>
+      </p:sp>
+      <p:sp>
+        <p:nvSpPr>
+          <p:cNvPr id="47" name="下矢印 46"/>
+          <p:cNvSpPr/>
+          <p:nvPr/>
+        </p:nvSpPr>
+        <p:spPr bwMode="blackGray">
+          <a:xfrm flipV="1">
+            <a:off x="2483768" y="2132856"/>
+            <a:ext cx="216024" cy="1728192"/>
+          </a:xfrm>
+          <a:prstGeom prst="downArrow">
+            <a:avLst/>
+          </a:prstGeom>
+          <a:noFill/>
+          <a:ln w="9525">
+            <a:solidFill>
+              <a:srgbClr val="FF0000"/>
+            </a:solidFill>
+            <a:prstDash val="dash"/>
+            <a:round/>
+            <a:headEnd/>
+            <a:tailEnd/>
+          </a:ln>
+          <a:extLst>
+            <a:ext uri="{909E8E84-426E-40DD-AFC4-6F175D3DCCD1}">
+              <a14:hiddenFill xmlns:a14="http://schemas.microsoft.com/office/drawing/2010/main">
+                <a:noFill/>
+              </a14:hiddenFill>
+            </a:ext>
+          </a:extLst>
+        </p:spPr>
+        <p:txBody>
+          <a:bodyPr rtlCol="0" anchor="ctr"/>
+          <a:lstStyle/>
+          <a:p>
+            <a:pPr algn="ctr"/>
+            <a:endParaRPr kumimoji="1" lang="ja-JP" altLang="en-US"/>
+          </a:p>
+        </p:txBody>
+      </p:sp>
+      <p:sp>
+        <p:nvSpPr>
+          <p:cNvPr id="48" name="下矢印 47"/>
+          <p:cNvSpPr/>
+          <p:nvPr/>
+        </p:nvSpPr>
+        <p:spPr bwMode="blackGray">
+          <a:xfrm flipV="1">
+            <a:off x="6624240" y="2564902"/>
+            <a:ext cx="180008" cy="1296145"/>
+          </a:xfrm>
+          <a:prstGeom prst="downArrow">
+            <a:avLst/>
+          </a:prstGeom>
+          <a:noFill/>
+          <a:ln w="9525">
+            <a:solidFill>
+              <a:srgbClr val="0070C0"/>
+            </a:solidFill>
+            <a:prstDash val="dash"/>
+            <a:round/>
+            <a:headEnd/>
+            <a:tailEnd/>
+          </a:ln>
+          <a:extLst>
+            <a:ext uri="{909E8E84-426E-40DD-AFC4-6F175D3DCCD1}">
+              <a14:hiddenFill xmlns:a14="http://schemas.microsoft.com/office/drawing/2010/main">
+                <a:noFill/>
+              </a14:hiddenFill>
+            </a:ext>
+          </a:extLst>
+        </p:spPr>
+        <p:txBody>
+          <a:bodyPr rtlCol="0" anchor="ctr"/>
+          <a:lstStyle/>
+          <a:p>
+            <a:pPr algn="ctr"/>
+            <a:endParaRPr kumimoji="1" lang="ja-JP" altLang="en-US"/>
+          </a:p>
+        </p:txBody>
+      </p:sp>
+      <p:sp>
+        <p:nvSpPr>
+          <p:cNvPr id="52" name="円/楕円 51"/>
+          <p:cNvSpPr/>
+          <p:nvPr/>
+        </p:nvSpPr>
+        <p:spPr bwMode="blackGray">
+          <a:xfrm>
+            <a:off x="2537780" y="1988598"/>
+            <a:ext cx="108000" cy="108000"/>
+          </a:xfrm>
+          <a:prstGeom prst="ellipse">
+            <a:avLst/>
+          </a:prstGeom>
+          <a:solidFill>
+            <a:schemeClr val="tx1">
+              <a:lumMod val="50000"/>
+              <a:lumOff val="50000"/>
+            </a:schemeClr>
+          </a:solidFill>
+          <a:ln w="9525">
+            <a:solidFill>
+              <a:srgbClr val="0070C0"/>
+            </a:solidFill>
+            <a:round/>
+            <a:headEnd/>
+            <a:tailEnd/>
+          </a:ln>
+          <a:extLst/>
+        </p:spPr>
+        <p:txBody>
+          <a:bodyPr rtlCol="0" anchor="ctr"/>
+          <a:lstStyle/>
+          <a:p>
+            <a:pPr algn="ctr"/>
+            <a:endParaRPr kumimoji="1" lang="ja-JP" altLang="en-US"/>
+          </a:p>
+        </p:txBody>
+      </p:sp>
       <p:pic>
         <p:nvPicPr>
-          <p:cNvPr id="1031" name="Picture 7"/>
+          <p:cNvPr id="34" name="Picture 2"/>
           <p:cNvPicPr>
             <a:picLocks noChangeAspect="1" noChangeArrowheads="1"/>
           </p:cNvPicPr>
@@ -9046,8 +9451,8 @@
         </p:blipFill>
         <p:spPr bwMode="auto">
           <a:xfrm>
-            <a:off x="6516216" y="5381822"/>
-            <a:ext cx="1800200" cy="999506"/>
+            <a:off x="6444208" y="5301208"/>
+            <a:ext cx="1869628" cy="972318"/>
           </a:xfrm>
           <a:prstGeom prst="rect">
             <a:avLst/>
@@ -9077,443 +9482,6 @@
           </a:extLst>
         </p:spPr>
       </p:pic>
-      <p:sp>
-        <p:nvSpPr>
-          <p:cNvPr id="42" name="テキスト ボックス 41"/>
-          <p:cNvSpPr txBox="1"/>
-          <p:nvPr/>
-        </p:nvSpPr>
-        <p:spPr>
-          <a:xfrm>
-            <a:off x="1594798" y="4365104"/>
-            <a:ext cx="312906" cy="369332"/>
-          </a:xfrm>
-          <a:prstGeom prst="rect">
-            <a:avLst/>
-          </a:prstGeom>
-          <a:noFill/>
-        </p:spPr>
-        <p:txBody>
-          <a:bodyPr wrap="none" rtlCol="0">
-            <a:spAutoFit/>
-          </a:bodyPr>
-          <a:lstStyle/>
-          <a:p>
-            <a:r>
-              <a:rPr lang="en-US" altLang="ja-JP" dirty="0" smtClean="0">
-                <a:solidFill>
-                  <a:srgbClr val="FF0000"/>
-                </a:solidFill>
-              </a:rPr>
-              <a:t>1</a:t>
-            </a:r>
-            <a:endParaRPr kumimoji="1" lang="ja-JP" altLang="en-US" dirty="0">
-              <a:solidFill>
-                <a:srgbClr val="FF0000"/>
-              </a:solidFill>
-            </a:endParaRPr>
-          </a:p>
-        </p:txBody>
-      </p:sp>
-      <p:sp>
-        <p:nvSpPr>
-          <p:cNvPr id="25" name="下矢印 24"/>
-          <p:cNvSpPr/>
-          <p:nvPr/>
-        </p:nvSpPr>
-        <p:spPr bwMode="blackGray">
-          <a:xfrm flipV="1">
-            <a:off x="5508104" y="3996353"/>
-            <a:ext cx="216024" cy="521478"/>
-          </a:xfrm>
-          <a:prstGeom prst="downArrow">
-            <a:avLst/>
-          </a:prstGeom>
-          <a:noFill/>
-          <a:ln w="9525">
-            <a:solidFill>
-              <a:schemeClr val="tx1"/>
-            </a:solidFill>
-            <a:round/>
-            <a:headEnd/>
-            <a:tailEnd/>
-          </a:ln>
-          <a:extLst>
-            <a:ext uri="{909E8E84-426E-40DD-AFC4-6F175D3DCCD1}">
-              <a14:hiddenFill xmlns:a14="http://schemas.microsoft.com/office/drawing/2010/main">
-                <a:noFill/>
-              </a14:hiddenFill>
-            </a:ext>
-          </a:extLst>
-        </p:spPr>
-        <p:txBody>
-          <a:bodyPr rtlCol="0" anchor="ctr"/>
-          <a:lstStyle/>
-          <a:p>
-            <a:pPr algn="ctr"/>
-            <a:endParaRPr kumimoji="1" lang="ja-JP" altLang="en-US"/>
-          </a:p>
-        </p:txBody>
-      </p:sp>
-      <p:sp>
-        <p:nvSpPr>
-          <p:cNvPr id="28" name="テキスト ボックス 27"/>
-          <p:cNvSpPr txBox="1"/>
-          <p:nvPr/>
-        </p:nvSpPr>
-        <p:spPr>
-          <a:xfrm>
-            <a:off x="5724128" y="4119463"/>
-            <a:ext cx="1656184" cy="461665"/>
-          </a:xfrm>
-          <a:prstGeom prst="rect">
-            <a:avLst/>
-          </a:prstGeom>
-          <a:noFill/>
-        </p:spPr>
-        <p:txBody>
-          <a:bodyPr wrap="square" rtlCol="0">
-            <a:spAutoFit/>
-          </a:bodyPr>
-          <a:lstStyle/>
-          <a:p>
-            <a:r>
-              <a:rPr lang="en-US" altLang="ja-JP" sz="1200" dirty="0"/>
-              <a:t>P</a:t>
-            </a:r>
-            <a:r>
-              <a:rPr kumimoji="1" lang="en-US" altLang="ja-JP" sz="1200" dirty="0" smtClean="0"/>
-              <a:t>arallelization </a:t>
-            </a:r>
-          </a:p>
-          <a:p>
-            <a:r>
-              <a:rPr kumimoji="1" lang="en-US" altLang="ja-JP" sz="1200" dirty="0" smtClean="0"/>
-              <a:t>by </a:t>
-            </a:r>
-            <a:r>
-              <a:rPr kumimoji="1" lang="en-US" altLang="ja-JP" sz="1200" dirty="0" smtClean="0"/>
-              <a:t>C++ compiler</a:t>
-            </a:r>
-            <a:endParaRPr kumimoji="1" lang="ja-JP" altLang="en-US" sz="1200" dirty="0"/>
-          </a:p>
-        </p:txBody>
-      </p:sp>
-      <p:sp>
-        <p:nvSpPr>
-          <p:cNvPr id="51" name="テキスト ボックス 50"/>
-          <p:cNvSpPr txBox="1"/>
-          <p:nvPr/>
-        </p:nvSpPr>
-        <p:spPr>
-          <a:xfrm>
-            <a:off x="2627784" y="2535287"/>
-            <a:ext cx="1330164" cy="461665"/>
-          </a:xfrm>
-          <a:prstGeom prst="rect">
-            <a:avLst/>
-          </a:prstGeom>
-          <a:noFill/>
-          <a:ln>
-            <a:solidFill>
-              <a:schemeClr val="bg1"/>
-            </a:solidFill>
-          </a:ln>
-        </p:spPr>
-        <p:txBody>
-          <a:bodyPr wrap="square" rtlCol="0">
-            <a:spAutoFit/>
-          </a:bodyPr>
-          <a:lstStyle/>
-          <a:p>
-            <a:r>
-              <a:rPr lang="en-US" altLang="ja-JP" sz="1200" dirty="0">
-                <a:solidFill>
-                  <a:srgbClr val="FF0000"/>
-                </a:solidFill>
-              </a:rPr>
-              <a:t>P</a:t>
-            </a:r>
-            <a:r>
-              <a:rPr kumimoji="1" lang="en-US" altLang="ja-JP" sz="1200" dirty="0" smtClean="0">
-                <a:solidFill>
-                  <a:srgbClr val="FF0000"/>
-                </a:solidFill>
-              </a:rPr>
-              <a:t>arallelization</a:t>
-            </a:r>
-            <a:r>
-              <a:rPr lang="ja-JP" altLang="en-US" sz="1200" dirty="0" smtClean="0">
-                <a:solidFill>
-                  <a:srgbClr val="FF0000"/>
-                </a:solidFill>
-              </a:rPr>
-              <a:t> </a:t>
-            </a:r>
-            <a:endParaRPr lang="en-US" altLang="ja-JP" sz="1200" dirty="0" smtClean="0">
-              <a:solidFill>
-                <a:srgbClr val="FF0000"/>
-              </a:solidFill>
-            </a:endParaRPr>
-          </a:p>
-          <a:p>
-            <a:r>
-              <a:rPr lang="en-US" altLang="ja-JP" sz="1200" dirty="0" smtClean="0">
-                <a:solidFill>
-                  <a:srgbClr val="FF0000"/>
-                </a:solidFill>
-              </a:rPr>
-              <a:t>by hand</a:t>
-            </a:r>
-            <a:endParaRPr kumimoji="1" lang="en-US" altLang="ja-JP" sz="1200" dirty="0" smtClean="0">
-              <a:solidFill>
-                <a:srgbClr val="FF0000"/>
-              </a:solidFill>
-            </a:endParaRPr>
-          </a:p>
-        </p:txBody>
-      </p:sp>
-      <p:sp>
-        <p:nvSpPr>
-          <p:cNvPr id="33" name="テキスト ボックス 32"/>
-          <p:cNvSpPr txBox="1"/>
-          <p:nvPr/>
-        </p:nvSpPr>
-        <p:spPr>
-          <a:xfrm>
-            <a:off x="2010772" y="4869160"/>
-            <a:ext cx="5801588" cy="369332"/>
-          </a:xfrm>
-          <a:prstGeom prst="rect">
-            <a:avLst/>
-          </a:prstGeom>
-          <a:noFill/>
-        </p:spPr>
-        <p:txBody>
-          <a:bodyPr wrap="none" rtlCol="0">
-            <a:spAutoFit/>
-          </a:bodyPr>
-          <a:lstStyle/>
-          <a:p>
-            <a:r>
-              <a:rPr kumimoji="1" lang="en-US" altLang="ja-JP" dirty="0" smtClean="0"/>
-              <a:t>Expressiveness of </a:t>
-            </a:r>
-            <a:r>
-              <a:rPr kumimoji="1" lang="en-US" altLang="ja-JP" dirty="0" smtClean="0"/>
-              <a:t>C++ code </a:t>
-            </a:r>
-            <a:r>
-              <a:rPr kumimoji="1" lang="en-US" altLang="ja-JP" dirty="0" smtClean="0"/>
-              <a:t>in </a:t>
-            </a:r>
-            <a:r>
-              <a:rPr lang="en-US" altLang="ja-JP" dirty="0" smtClean="0"/>
-              <a:t>mathematical modeling</a:t>
-            </a:r>
-            <a:endParaRPr kumimoji="1" lang="ja-JP" altLang="en-US" dirty="0"/>
-          </a:p>
-        </p:txBody>
-      </p:sp>
-      <p:cxnSp>
-        <p:nvCxnSpPr>
-          <p:cNvPr id="37" name="直線矢印コネクタ 36"/>
-          <p:cNvCxnSpPr>
-            <a:stCxn id="13" idx="5"/>
-          </p:cNvCxnSpPr>
-          <p:nvPr/>
-        </p:nvCxnSpPr>
-        <p:spPr>
-          <a:xfrm flipV="1">
-            <a:off x="4484176" y="3915048"/>
-            <a:ext cx="2194064" cy="0"/>
-          </a:xfrm>
-          <a:prstGeom prst="straightConnector1">
-            <a:avLst/>
-          </a:prstGeom>
-          <a:ln w="22225">
-            <a:solidFill>
-              <a:srgbClr val="0070C0"/>
-            </a:solidFill>
-            <a:prstDash val="dash"/>
-            <a:tailEnd type="arrow"/>
-          </a:ln>
-        </p:spPr>
-        <p:style>
-          <a:lnRef idx="1">
-            <a:schemeClr val="accent1"/>
-          </a:lnRef>
-          <a:fillRef idx="0">
-            <a:schemeClr val="accent1"/>
-          </a:fillRef>
-          <a:effectRef idx="0">
-            <a:schemeClr val="accent1"/>
-          </a:effectRef>
-          <a:fontRef idx="minor">
-            <a:schemeClr val="tx1"/>
-          </a:fontRef>
-        </p:style>
-      </p:cxnSp>
-      <p:sp>
-        <p:nvSpPr>
-          <p:cNvPr id="45" name="円/楕円 44"/>
-          <p:cNvSpPr/>
-          <p:nvPr/>
-        </p:nvSpPr>
-        <p:spPr bwMode="blackGray">
-          <a:xfrm>
-            <a:off x="6660232" y="3861048"/>
-            <a:ext cx="108000" cy="108000"/>
-          </a:xfrm>
-          <a:prstGeom prst="ellipse">
-            <a:avLst/>
-          </a:prstGeom>
-          <a:solidFill>
-            <a:schemeClr val="tx1">
-              <a:lumMod val="50000"/>
-              <a:lumOff val="50000"/>
-            </a:schemeClr>
-          </a:solidFill>
-          <a:ln w="9525">
-            <a:solidFill>
-              <a:srgbClr val="0070C0"/>
-            </a:solidFill>
-            <a:round/>
-            <a:headEnd/>
-            <a:tailEnd/>
-          </a:ln>
-          <a:extLst/>
-        </p:spPr>
-        <p:txBody>
-          <a:bodyPr rtlCol="0" anchor="ctr"/>
-          <a:lstStyle/>
-          <a:p>
-            <a:pPr algn="ctr"/>
-            <a:endParaRPr kumimoji="1" lang="ja-JP" altLang="en-US"/>
-          </a:p>
-        </p:txBody>
-      </p:sp>
-      <p:sp>
-        <p:nvSpPr>
-          <p:cNvPr id="47" name="下矢印 46"/>
-          <p:cNvSpPr/>
-          <p:nvPr/>
-        </p:nvSpPr>
-        <p:spPr bwMode="blackGray">
-          <a:xfrm flipV="1">
-            <a:off x="2483768" y="2132856"/>
-            <a:ext cx="216024" cy="1728192"/>
-          </a:xfrm>
-          <a:prstGeom prst="downArrow">
-            <a:avLst/>
-          </a:prstGeom>
-          <a:noFill/>
-          <a:ln w="9525">
-            <a:solidFill>
-              <a:srgbClr val="FF0000"/>
-            </a:solidFill>
-            <a:prstDash val="dash"/>
-            <a:round/>
-            <a:headEnd/>
-            <a:tailEnd/>
-          </a:ln>
-          <a:extLst>
-            <a:ext uri="{909E8E84-426E-40DD-AFC4-6F175D3DCCD1}">
-              <a14:hiddenFill xmlns:a14="http://schemas.microsoft.com/office/drawing/2010/main">
-                <a:noFill/>
-              </a14:hiddenFill>
-            </a:ext>
-          </a:extLst>
-        </p:spPr>
-        <p:txBody>
-          <a:bodyPr rtlCol="0" anchor="ctr"/>
-          <a:lstStyle/>
-          <a:p>
-            <a:pPr algn="ctr"/>
-            <a:endParaRPr kumimoji="1" lang="ja-JP" altLang="en-US"/>
-          </a:p>
-        </p:txBody>
-      </p:sp>
-      <p:sp>
-        <p:nvSpPr>
-          <p:cNvPr id="48" name="下矢印 47"/>
-          <p:cNvSpPr/>
-          <p:nvPr/>
-        </p:nvSpPr>
-        <p:spPr bwMode="blackGray">
-          <a:xfrm flipV="1">
-            <a:off x="6624240" y="2564902"/>
-            <a:ext cx="180008" cy="1296145"/>
-          </a:xfrm>
-          <a:prstGeom prst="downArrow">
-            <a:avLst/>
-          </a:prstGeom>
-          <a:noFill/>
-          <a:ln w="9525">
-            <a:solidFill>
-              <a:srgbClr val="0070C0"/>
-            </a:solidFill>
-            <a:prstDash val="dash"/>
-            <a:round/>
-            <a:headEnd/>
-            <a:tailEnd/>
-          </a:ln>
-          <a:extLst>
-            <a:ext uri="{909E8E84-426E-40DD-AFC4-6F175D3DCCD1}">
-              <a14:hiddenFill xmlns:a14="http://schemas.microsoft.com/office/drawing/2010/main">
-                <a:noFill/>
-              </a14:hiddenFill>
-            </a:ext>
-          </a:extLst>
-        </p:spPr>
-        <p:txBody>
-          <a:bodyPr rtlCol="0" anchor="ctr"/>
-          <a:lstStyle/>
-          <a:p>
-            <a:pPr algn="ctr"/>
-            <a:endParaRPr kumimoji="1" lang="ja-JP" altLang="en-US"/>
-          </a:p>
-        </p:txBody>
-      </p:sp>
-      <p:sp>
-        <p:nvSpPr>
-          <p:cNvPr id="52" name="円/楕円 51"/>
-          <p:cNvSpPr/>
-          <p:nvPr/>
-        </p:nvSpPr>
-        <p:spPr bwMode="blackGray">
-          <a:xfrm>
-            <a:off x="2537780" y="1988598"/>
-            <a:ext cx="108000" cy="108000"/>
-          </a:xfrm>
-          <a:prstGeom prst="ellipse">
-            <a:avLst/>
-          </a:prstGeom>
-          <a:solidFill>
-            <a:schemeClr val="tx1">
-              <a:lumMod val="50000"/>
-              <a:lumOff val="50000"/>
-            </a:schemeClr>
-          </a:solidFill>
-          <a:ln w="9525">
-            <a:solidFill>
-              <a:srgbClr val="0070C0"/>
-            </a:solidFill>
-            <a:round/>
-            <a:headEnd/>
-            <a:tailEnd/>
-          </a:ln>
-          <a:extLst/>
-        </p:spPr>
-        <p:txBody>
-          <a:bodyPr rtlCol="0" anchor="ctr"/>
-          <a:lstStyle/>
-          <a:p>
-            <a:pPr algn="ctr"/>
-            <a:endParaRPr kumimoji="1" lang="ja-JP" altLang="en-US"/>
-          </a:p>
-        </p:txBody>
-      </p:sp>
     </p:spTree>
     <p:extLst>
       <p:ext uri="{BB962C8B-B14F-4D97-AF65-F5344CB8AC3E}">

</xml_diff>